<commit_message>
moving GH URL + adding real pictures + Readme
</commit_message>
<xml_diff>
--- a/PCB/schematics-v18/readme-media/home-connections.pptx
+++ b/PCB/schematics-v18/readme-media/home-connections.pptx
@@ -261,7 +261,7 @@
           <a:p>
             <a:fld id="{26A2C88A-BAEE-46D6-8568-B2FDD65BE323}" type="datetimeFigureOut">
               <a:rPr lang="en-CH" smtClean="0"/>
-              <a:t>30/05/2022</a:t>
+              <a:t>03/06/2022</a:t>
             </a:fld>
             <a:endParaRPr lang="en-CH"/>
           </a:p>
@@ -461,7 +461,7 @@
           <a:p>
             <a:fld id="{26A2C88A-BAEE-46D6-8568-B2FDD65BE323}" type="datetimeFigureOut">
               <a:rPr lang="en-CH" smtClean="0"/>
-              <a:t>30/05/2022</a:t>
+              <a:t>03/06/2022</a:t>
             </a:fld>
             <a:endParaRPr lang="en-CH"/>
           </a:p>
@@ -671,7 +671,7 @@
           <a:p>
             <a:fld id="{26A2C88A-BAEE-46D6-8568-B2FDD65BE323}" type="datetimeFigureOut">
               <a:rPr lang="en-CH" smtClean="0"/>
-              <a:t>30/05/2022</a:t>
+              <a:t>03/06/2022</a:t>
             </a:fld>
             <a:endParaRPr lang="en-CH"/>
           </a:p>
@@ -871,7 +871,7 @@
           <a:p>
             <a:fld id="{26A2C88A-BAEE-46D6-8568-B2FDD65BE323}" type="datetimeFigureOut">
               <a:rPr lang="en-CH" smtClean="0"/>
-              <a:t>30/05/2022</a:t>
+              <a:t>03/06/2022</a:t>
             </a:fld>
             <a:endParaRPr lang="en-CH"/>
           </a:p>
@@ -1147,7 +1147,7 @@
           <a:p>
             <a:fld id="{26A2C88A-BAEE-46D6-8568-B2FDD65BE323}" type="datetimeFigureOut">
               <a:rPr lang="en-CH" smtClean="0"/>
-              <a:t>30/05/2022</a:t>
+              <a:t>03/06/2022</a:t>
             </a:fld>
             <a:endParaRPr lang="en-CH"/>
           </a:p>
@@ -1415,7 +1415,7 @@
           <a:p>
             <a:fld id="{26A2C88A-BAEE-46D6-8568-B2FDD65BE323}" type="datetimeFigureOut">
               <a:rPr lang="en-CH" smtClean="0"/>
-              <a:t>30/05/2022</a:t>
+              <a:t>03/06/2022</a:t>
             </a:fld>
             <a:endParaRPr lang="en-CH"/>
           </a:p>
@@ -1830,7 +1830,7 @@
           <a:p>
             <a:fld id="{26A2C88A-BAEE-46D6-8568-B2FDD65BE323}" type="datetimeFigureOut">
               <a:rPr lang="en-CH" smtClean="0"/>
-              <a:t>30/05/2022</a:t>
+              <a:t>03/06/2022</a:t>
             </a:fld>
             <a:endParaRPr lang="en-CH"/>
           </a:p>
@@ -1972,7 +1972,7 @@
           <a:p>
             <a:fld id="{26A2C88A-BAEE-46D6-8568-B2FDD65BE323}" type="datetimeFigureOut">
               <a:rPr lang="en-CH" smtClean="0"/>
-              <a:t>30/05/2022</a:t>
+              <a:t>03/06/2022</a:t>
             </a:fld>
             <a:endParaRPr lang="en-CH"/>
           </a:p>
@@ -2085,7 +2085,7 @@
           <a:p>
             <a:fld id="{26A2C88A-BAEE-46D6-8568-B2FDD65BE323}" type="datetimeFigureOut">
               <a:rPr lang="en-CH" smtClean="0"/>
-              <a:t>30/05/2022</a:t>
+              <a:t>03/06/2022</a:t>
             </a:fld>
             <a:endParaRPr lang="en-CH"/>
           </a:p>
@@ -2398,7 +2398,7 @@
           <a:p>
             <a:fld id="{26A2C88A-BAEE-46D6-8568-B2FDD65BE323}" type="datetimeFigureOut">
               <a:rPr lang="en-CH" smtClean="0"/>
-              <a:t>30/05/2022</a:t>
+              <a:t>03/06/2022</a:t>
             </a:fld>
             <a:endParaRPr lang="en-CH"/>
           </a:p>
@@ -2687,7 +2687,7 @@
           <a:p>
             <a:fld id="{26A2C88A-BAEE-46D6-8568-B2FDD65BE323}" type="datetimeFigureOut">
               <a:rPr lang="en-CH" smtClean="0"/>
-              <a:t>30/05/2022</a:t>
+              <a:t>03/06/2022</a:t>
             </a:fld>
             <a:endParaRPr lang="en-CH"/>
           </a:p>
@@ -2930,7 +2930,7 @@
           <a:p>
             <a:fld id="{26A2C88A-BAEE-46D6-8568-B2FDD65BE323}" type="datetimeFigureOut">
               <a:rPr lang="en-CH" smtClean="0"/>
-              <a:t>30/05/2022</a:t>
+              <a:t>03/06/2022</a:t>
             </a:fld>
             <a:endParaRPr lang="en-CH"/>
           </a:p>
@@ -3347,42 +3347,6 @@
           <a:chExt cx="0" cy="0"/>
         </a:xfrm>
       </p:grpSpPr>
-      <p:pic>
-        <p:nvPicPr>
-          <p:cNvPr id="3" name="Picture 2" descr="A screenshot of a computer&#10;&#10;Description automatically generated with medium confidence">
-            <a:extLst>
-              <a:ext uri="{FF2B5EF4-FFF2-40B4-BE49-F238E27FC236}">
-                <a16:creationId xmlns:a16="http://schemas.microsoft.com/office/drawing/2014/main" id="{1E80AA60-3983-094F-FAB4-74E3A6090141}"/>
-              </a:ext>
-            </a:extLst>
-          </p:cNvPr>
-          <p:cNvPicPr>
-            <a:picLocks noChangeAspect="1"/>
-          </p:cNvPicPr>
-          <p:nvPr/>
-        </p:nvPicPr>
-        <p:blipFill>
-          <a:blip r:embed="rId2">
-            <a:extLst>
-              <a:ext uri="{28A0092B-C50C-407E-A947-70E740481C1C}">
-                <a14:useLocalDpi xmlns:a14="http://schemas.microsoft.com/office/drawing/2010/main" val="0"/>
-              </a:ext>
-            </a:extLst>
-          </a:blip>
-          <a:stretch>
-            <a:fillRect/>
-          </a:stretch>
-        </p:blipFill>
-        <p:spPr>
-          <a:xfrm>
-            <a:off x="2038885" y="1896022"/>
-            <a:ext cx="2153465" cy="2287084"/>
-          </a:xfrm>
-          <a:prstGeom prst="rect">
-            <a:avLst/>
-          </a:prstGeom>
-        </p:spPr>
-      </p:pic>
       <p:cxnSp>
         <p:nvCxnSpPr>
           <p:cNvPr id="58" name="Straight Connector 57">
@@ -3476,11 +3440,11 @@
           <p:nvPr/>
         </p:nvPicPr>
         <p:blipFill>
-          <a:blip r:embed="rId3">
+          <a:blip r:embed="rId2">
             <a:extLst>
               <a:ext uri="{BEBA8EAE-BF5A-486C-A8C5-ECC9F3942E4B}">
                 <a14:imgProps xmlns:a14="http://schemas.microsoft.com/office/drawing/2010/main">
-                  <a14:imgLayer r:embed="rId4">
+                  <a14:imgLayer r:embed="rId3">
                     <a14:imgEffect>
                       <a14:backgroundRemoval t="4167" b="97619" l="10000" r="90000">
                         <a14:foregroundMark x1="73333" y1="84524" x2="43667" y2="91667"/>
@@ -3549,7 +3513,7 @@
           <p:nvPr/>
         </p:nvPicPr>
         <p:blipFill>
-          <a:blip r:embed="rId5"/>
+          <a:blip r:embed="rId4"/>
           <a:stretch>
             <a:fillRect/>
           </a:stretch>
@@ -3579,7 +3543,7 @@
           <p:nvPr/>
         </p:nvPicPr>
         <p:blipFill>
-          <a:blip r:embed="rId6">
+          <a:blip r:embed="rId5">
             <a:extLst>
               <a:ext uri="{28A0092B-C50C-407E-A947-70E740481C1C}">
                 <a14:useLocalDpi xmlns:a14="http://schemas.microsoft.com/office/drawing/2010/main" val="0"/>
@@ -4079,11 +4043,11 @@
           <p:nvPr/>
         </p:nvPicPr>
         <p:blipFill>
-          <a:blip r:embed="rId3">
+          <a:blip r:embed="rId2">
             <a:extLst>
               <a:ext uri="{BEBA8EAE-BF5A-486C-A8C5-ECC9F3942E4B}">
                 <a14:imgProps xmlns:a14="http://schemas.microsoft.com/office/drawing/2010/main">
-                  <a14:imgLayer r:embed="rId4">
+                  <a14:imgLayer r:embed="rId3">
                     <a14:imgEffect>
                       <a14:backgroundRemoval t="4167" b="97619" l="10000" r="90000">
                         <a14:foregroundMark x1="73333" y1="84524" x2="43667" y2="91667"/>
@@ -4152,11 +4116,11 @@
           <p:nvPr/>
         </p:nvPicPr>
         <p:blipFill>
-          <a:blip r:embed="rId3">
+          <a:blip r:embed="rId2">
             <a:extLst>
               <a:ext uri="{BEBA8EAE-BF5A-486C-A8C5-ECC9F3942E4B}">
                 <a14:imgProps xmlns:a14="http://schemas.microsoft.com/office/drawing/2010/main">
-                  <a14:imgLayer r:embed="rId4">
+                  <a14:imgLayer r:embed="rId3">
                     <a14:imgEffect>
                       <a14:backgroundRemoval t="4167" b="97619" l="10000" r="90000">
                         <a14:foregroundMark x1="73333" y1="84524" x2="43667" y2="91667"/>
@@ -4837,6 +4801,41 @@
           </a:fontRef>
         </p:style>
       </p:cxnSp>
+      <p:pic>
+        <p:nvPicPr>
+          <p:cNvPr id="5" name="Picture 4" descr="Graphical user interface&#10;&#10;Description automatically generated">
+            <a:extLst>
+              <a:ext uri="{FF2B5EF4-FFF2-40B4-BE49-F238E27FC236}">
+                <a16:creationId xmlns:a16="http://schemas.microsoft.com/office/drawing/2014/main" id="{EED803E6-09B6-D1CE-B68E-10EF94884570}"/>
+              </a:ext>
+            </a:extLst>
+          </p:cNvPr>
+          <p:cNvPicPr>
+            <a:picLocks noChangeAspect="1"/>
+          </p:cNvPicPr>
+          <p:nvPr/>
+        </p:nvPicPr>
+        <p:blipFill rotWithShape="1">
+          <a:blip r:embed="rId6">
+            <a:extLst>
+              <a:ext uri="{28A0092B-C50C-407E-A947-70E740481C1C}">
+                <a14:useLocalDpi xmlns:a14="http://schemas.microsoft.com/office/drawing/2010/main" val="0"/>
+              </a:ext>
+            </a:extLst>
+          </a:blip>
+          <a:srcRect l="5142" t="2958" r="6910" b="1185"/>
+          <a:stretch/>
+        </p:blipFill>
+        <p:spPr>
+          <a:xfrm>
+            <a:off x="2017798" y="1924492"/>
+            <a:ext cx="2016359" cy="2287084"/>
+          </a:xfrm>
+          <a:prstGeom prst="rect">
+            <a:avLst/>
+          </a:prstGeom>
+        </p:spPr>
+      </p:pic>
     </p:spTree>
     <p:extLst>
       <p:ext uri="{BB962C8B-B14F-4D97-AF65-F5344CB8AC3E}">

</xml_diff>